<commit_message>
Changes in Px_z1 function
</commit_message>
<xml_diff>
--- a/PresentationFriday8:25.pptx
+++ b/PresentationFriday8:25.pptx
@@ -4389,7 +4389,7 @@
           <a:lstStyle/>
           <a:p>
             <a:r>
-              <a:rPr lang="en-US" smtClean="0"/>
+              <a:rPr lang="en-US" dirty="0" smtClean="0"/>
               <a:t>Final Remarks and Future Work</a:t>
             </a:r>
             <a:endParaRPr lang="en-US" dirty="0"/>
@@ -4421,23 +4421,29 @@
             </a:r>
             <a:r>
               <a:rPr lang="en-US" dirty="0" smtClean="0"/>
-              <a:t> Bayes – For this we would need to change the representation of the DP to stick breaking representation so we can compute gradients</a:t>
-            </a:r>
+              <a:t> Bayes – For this we would need to change the representation of the DP to stick breaking representation so we can </a:t>
+            </a:r>
+            <a:r>
+              <a:rPr lang="en-US" smtClean="0"/>
+              <a:t>compute gradients</a:t>
+            </a:r>
+          </a:p>
+          <a:p>
+            <a:endParaRPr lang="en-US" dirty="0" smtClean="0"/>
           </a:p>
           <a:p>
             <a:r>
               <a:rPr lang="en-US" dirty="0" smtClean="0"/>
-              <a:t>Difficult to choose the right set of hyper-parameters</a:t>
-            </a:r>
-          </a:p>
-          <a:p>
-            <a:endParaRPr lang="en-US" dirty="0" smtClean="0"/>
-          </a:p>
-          <a:p>
-            <a:endParaRPr lang="en-US" dirty="0" smtClean="0"/>
-          </a:p>
-          <a:p>
-            <a:endParaRPr lang="en-US" dirty="0"/>
+              <a:t>Difficult to choose the right set of hyper-parameters since </a:t>
+            </a:r>
+            <a:r>
+              <a:rPr lang="en-US" dirty="0" err="1" smtClean="0"/>
+              <a:t>gibbs</a:t>
+            </a:r>
+            <a:r>
+              <a:rPr lang="en-US" dirty="0" smtClean="0"/>
+              <a:t> sampling is slow </a:t>
+            </a:r>
           </a:p>
         </p:txBody>
       </p:sp>

</xml_diff>